<commit_message>
remove unused resource files
</commit_message>
<xml_diff>
--- a/sessions/2018/csharp/Whats Coming to Csharp.pptx
+++ b/sessions/2018/csharp/Whats Coming to Csharp.pptx
@@ -246,7 +246,7 @@
           <a:p>
             <a:fld id="{18438622-0837-4E9E-A16C-0B0206CE676E}" type="datetimeFigureOut">
               <a:rPr lang="en-US" smtClean="0"/>
-              <a:t>9/19/2018</a:t>
+              <a:t>11/3/2018</a:t>
             </a:fld>
             <a:endParaRPr lang="en-US"/>
           </a:p>
@@ -974,7 +974,7 @@
           <a:p>
             <a:fld id="{D18B56EA-E28F-4F92-9F16-7A6F2501B303}" type="datetime8">
               <a:rPr lang="en-US" smtClean="0"/>
-              <a:t>9/19/2018 9:07 AM</a:t>
+              <a:t>11/3/2018 7:10 PM</a:t>
             </a:fld>
             <a:endParaRPr lang="en-US"/>
           </a:p>
@@ -1142,7 +1142,7 @@
           <a:p>
             <a:fld id="{D18B56EA-E28F-4F92-9F16-7A6F2501B303}" type="datetime8">
               <a:rPr lang="en-US" smtClean="0"/>
-              <a:t>9/19/2018 9:07 AM</a:t>
+              <a:t>11/3/2018 7:10 PM</a:t>
             </a:fld>
             <a:endParaRPr lang="en-US"/>
           </a:p>
@@ -1310,7 +1310,7 @@
           <a:p>
             <a:fld id="{D18B56EA-E28F-4F92-9F16-7A6F2501B303}" type="datetime8">
               <a:rPr lang="en-US" smtClean="0"/>
-              <a:t>9/19/2018 9:07 AM</a:t>
+              <a:t>11/3/2018 7:10 PM</a:t>
             </a:fld>
             <a:endParaRPr lang="en-US"/>
           </a:p>
@@ -1478,7 +1478,7 @@
           <a:p>
             <a:fld id="{D18B56EA-E28F-4F92-9F16-7A6F2501B303}" type="datetime8">
               <a:rPr lang="en-US" smtClean="0"/>
-              <a:t>9/19/2018 9:07 AM</a:t>
+              <a:t>11/3/2018 7:10 PM</a:t>
             </a:fld>
             <a:endParaRPr lang="en-US"/>
           </a:p>
@@ -13831,7 +13831,7 @@
           <a:p>
             <a:r>
               <a:rPr lang="en-US" dirty="0"/>
-              <a:t>Mads Torgersen</a:t>
+              <a:t>William Fuqua</a:t>
             </a:r>
           </a:p>
         </p:txBody>
@@ -19635,15 +19635,6 @@
 </file>
 
 <file path=customXml/item1.xml><?xml version="1.0" encoding="utf-8"?>
-<?mso-contentType ?>
-<FormTemplates xmlns="http://schemas.microsoft.com/sharepoint/v3/contenttype/forms">
-  <Display>DocumentLibraryForm</Display>
-  <Edit>DocumentLibraryForm</Edit>
-  <New>DocumentLibraryForm</New>
-</FormTemplates>
-</file>
-
-<file path=customXml/item2.xml><?xml version="1.0" encoding="utf-8"?>
 <ct:contentTypeSchema xmlns:ct="http://schemas.microsoft.com/office/2006/metadata/contentType" xmlns:ma="http://schemas.microsoft.com/office/2006/metadata/properties/metaAttributes" ct:_="" ma:_="" ma:contentTypeName="Document" ma:contentTypeID="0x01010022F88B0CCF1BBA489747F146E6B5E06D" ma:contentTypeVersion="11" ma:contentTypeDescription="Create a new document." ma:contentTypeScope="" ma:versionID="4679f38185fefde8b23806f702b522cc">
   <xsd:schema xmlns:xsd="http://www.w3.org/2001/XMLSchema" xmlns:xs="http://www.w3.org/2001/XMLSchema" xmlns:p="http://schemas.microsoft.com/office/2006/metadata/properties" xmlns:ns1="http://schemas.microsoft.com/sharepoint/v3" xmlns:ns2="569b343d-e775-480b-9b2b-6a6986deb9b0" xmlns:ns3="11245976-3b4d-4794-a754-317688483df2" targetNamespace="http://schemas.microsoft.com/office/2006/metadata/properties" ma:root="true" ma:fieldsID="366371b317520ec9a5ad3c1303c823ef" ns1:_="" ns2:_="" ns3:_="">
     <xsd:import namespace="http://schemas.microsoft.com/sharepoint/v3"/>
@@ -19857,6 +19848,15 @@
 </ct:contentTypeSchema>
 </file>
 
+<file path=customXml/item2.xml><?xml version="1.0" encoding="utf-8"?>
+<?mso-contentType ?>
+<FormTemplates xmlns="http://schemas.microsoft.com/sharepoint/v3/contenttype/forms">
+  <Display>DocumentLibraryForm</Display>
+  <Edit>DocumentLibraryForm</Edit>
+  <New>DocumentLibraryForm</New>
+</FormTemplates>
+</file>
+
 <file path=customXml/item3.xml><?xml version="1.0" encoding="utf-8"?>
 <p:properties xmlns:p="http://schemas.microsoft.com/office/2006/metadata/properties" xmlns:xsi="http://www.w3.org/2001/XMLSchema-instance" xmlns:pc="http://schemas.microsoft.com/office/infopath/2007/PartnerControls">
   <documentManagement>
@@ -19876,14 +19876,6 @@
 </file>
 
 <file path=customXml/itemProps1.xml><?xml version="1.0" encoding="utf-8"?>
-<ds:datastoreItem xmlns:ds="http://schemas.openxmlformats.org/officeDocument/2006/customXml" ds:itemID="{093821A7-5528-48BE-BD00-067FBFDD28D5}">
-  <ds:schemaRefs>
-    <ds:schemaRef ds:uri="http://schemas.microsoft.com/sharepoint/v3/contenttype/forms"/>
-  </ds:schemaRefs>
-</ds:datastoreItem>
-</file>
-
-<file path=customXml/itemProps2.xml><?xml version="1.0" encoding="utf-8"?>
 <ds:datastoreItem xmlns:ds="http://schemas.openxmlformats.org/officeDocument/2006/customXml" ds:itemID="{16E8CB18-CF19-487B-A6ED-834044BC878F}">
   <ds:schemaRefs>
     <ds:schemaRef ds:uri="http://schemas.microsoft.com/office/2006/metadata/contentType"/>
@@ -19899,6 +19891,14 @@
     <ds:schemaRef ds:uri="http://purl.org/dc/elements/1.1/"/>
     <ds:schemaRef ds:uri="http://purl.org/dc/terms/"/>
     <ds:schemaRef ds:uri="http://schemas.microsoft.com/internal/obd"/>
+  </ds:schemaRefs>
+</ds:datastoreItem>
+</file>
+
+<file path=customXml/itemProps2.xml><?xml version="1.0" encoding="utf-8"?>
+<ds:datastoreItem xmlns:ds="http://schemas.openxmlformats.org/officeDocument/2006/customXml" ds:itemID="{093821A7-5528-48BE-BD00-067FBFDD28D5}">
+  <ds:schemaRefs>
+    <ds:schemaRef ds:uri="http://schemas.microsoft.com/sharepoint/v3/contenttype/forms"/>
   </ds:schemaRefs>
 </ds:datastoreItem>
 </file>

</xml_diff>